<commit_message>
Update runner for new choices
</commit_message>
<xml_diff>
--- a/run_many_models_results.pptx
+++ b/run_many_models_results.pptx
@@ -3152,7 +3152,7 @@
         <p:spPr>
           <a:xfrm>
             <a:off x="914400" y="914400"/>
-            <a:ext cx="7315200" cy="11149079"/>
+            <a:ext cx="7315200" cy="11086781"/>
           </a:xfrm>
           <a:prstGeom prst="rect">
             <a:avLst/>
@@ -3194,7 +3194,7 @@
         <p:spPr>
           <a:xfrm>
             <a:off x="914400" y="914400"/>
-            <a:ext cx="7315200" cy="11149079"/>
+            <a:ext cx="7315200" cy="11086781"/>
           </a:xfrm>
           <a:prstGeom prst="rect">
             <a:avLst/>
@@ -3236,7 +3236,7 @@
         <p:spPr>
           <a:xfrm>
             <a:off x="914400" y="914400"/>
-            <a:ext cx="7315200" cy="11149079"/>
+            <a:ext cx="7315200" cy="11086781"/>
           </a:xfrm>
           <a:prstGeom prst="rect">
             <a:avLst/>
@@ -3278,7 +3278,7 @@
         <p:spPr>
           <a:xfrm>
             <a:off x="914400" y="914400"/>
-            <a:ext cx="7315200" cy="11149079"/>
+            <a:ext cx="7315200" cy="11086781"/>
           </a:xfrm>
           <a:prstGeom prst="rect">
             <a:avLst/>

</xml_diff>

<commit_message>
Use img size 320 for test ,prep for moving avg/std
</commit_message>
<xml_diff>
--- a/run_many_models_results.pptx
+++ b/run_many_models_results.pptx
@@ -6,10 +6,6 @@
   </p:sldMasterIdLst>
   <p:sldIdLst>
     <p:sldId id="256" r:id="rId7"/>
-    <p:sldId id="257" r:id="rId8"/>
-    <p:sldId id="258" r:id="rId9"/>
-    <p:sldId id="259" r:id="rId10"/>
-    <p:sldId id="260" r:id="rId11"/>
   </p:sldIdLst>
   <p:sldSz cx="9144000" cy="6858000" type="screen4x3"/>
   <p:notesSz cx="6858000" cy="9144000"/>
@@ -3110,174 +3106,6 @@
           <a:xfrm>
             <a:off x="914400" y="914400"/>
             <a:ext cx="7315200" cy="10954935"/>
-          </a:xfrm>
-          <a:prstGeom prst="rect">
-            <a:avLst/>
-          </a:prstGeom>
-        </p:spPr>
-      </p:pic>
-    </p:spTree>
-  </p:cSld>
-  <p:clrMapOvr>
-    <a:masterClrMapping/>
-  </p:clrMapOvr>
-</p:sld>
-</file>
-
-<file path=ppt/slides/slide2.xml><?xml version="1.0" encoding="utf-8"?>
-<p:sld xmlns:a="http://schemas.openxmlformats.org/drawingml/2006/main" xmlns:p="http://schemas.openxmlformats.org/presentationml/2006/main" xmlns:r="http://schemas.openxmlformats.org/officeDocument/2006/relationships">
-  <p:cSld>
-    <p:spTree>
-      <p:nvGrpSpPr>
-        <p:cNvPr id="1" name=""/>
-        <p:cNvGrpSpPr/>
-        <p:nvPr/>
-      </p:nvGrpSpPr>
-      <p:grpSpPr/>
-      <p:pic>
-        <p:nvPicPr>
-          <p:cNvPr id="2" name="Picture 1" descr="figure_2.png"/>
-          <p:cNvPicPr>
-            <a:picLocks noChangeAspect="1"/>
-          </p:cNvPicPr>
-          <p:nvPr/>
-        </p:nvPicPr>
-        <p:blipFill>
-          <a:blip r:embed="rId2"/>
-          <a:stretch>
-            <a:fillRect/>
-          </a:stretch>
-        </p:blipFill>
-        <p:spPr>
-          <a:xfrm>
-            <a:off x="914400" y="914400"/>
-            <a:ext cx="7315200" cy="10929405"/>
-          </a:xfrm>
-          <a:prstGeom prst="rect">
-            <a:avLst/>
-          </a:prstGeom>
-        </p:spPr>
-      </p:pic>
-    </p:spTree>
-  </p:cSld>
-  <p:clrMapOvr>
-    <a:masterClrMapping/>
-  </p:clrMapOvr>
-</p:sld>
-</file>
-
-<file path=ppt/slides/slide3.xml><?xml version="1.0" encoding="utf-8"?>
-<p:sld xmlns:a="http://schemas.openxmlformats.org/drawingml/2006/main" xmlns:p="http://schemas.openxmlformats.org/presentationml/2006/main" xmlns:r="http://schemas.openxmlformats.org/officeDocument/2006/relationships">
-  <p:cSld>
-    <p:spTree>
-      <p:nvGrpSpPr>
-        <p:cNvPr id="1" name=""/>
-        <p:cNvGrpSpPr/>
-        <p:nvPr/>
-      </p:nvGrpSpPr>
-      <p:grpSpPr/>
-      <p:pic>
-        <p:nvPicPr>
-          <p:cNvPr id="2" name="Picture 1" descr="figure_3.png"/>
-          <p:cNvPicPr>
-            <a:picLocks noChangeAspect="1"/>
-          </p:cNvPicPr>
-          <p:nvPr/>
-        </p:nvPicPr>
-        <p:blipFill>
-          <a:blip r:embed="rId2"/>
-          <a:stretch>
-            <a:fillRect/>
-          </a:stretch>
-        </p:blipFill>
-        <p:spPr>
-          <a:xfrm>
-            <a:off x="914400" y="914400"/>
-            <a:ext cx="7315200" cy="10954935"/>
-          </a:xfrm>
-          <a:prstGeom prst="rect">
-            <a:avLst/>
-          </a:prstGeom>
-        </p:spPr>
-      </p:pic>
-    </p:spTree>
-  </p:cSld>
-  <p:clrMapOvr>
-    <a:masterClrMapping/>
-  </p:clrMapOvr>
-</p:sld>
-</file>
-
-<file path=ppt/slides/slide4.xml><?xml version="1.0" encoding="utf-8"?>
-<p:sld xmlns:a="http://schemas.openxmlformats.org/drawingml/2006/main" xmlns:p="http://schemas.openxmlformats.org/presentationml/2006/main" xmlns:r="http://schemas.openxmlformats.org/officeDocument/2006/relationships">
-  <p:cSld>
-    <p:spTree>
-      <p:nvGrpSpPr>
-        <p:cNvPr id="1" name=""/>
-        <p:cNvGrpSpPr/>
-        <p:nvPr/>
-      </p:nvGrpSpPr>
-      <p:grpSpPr/>
-      <p:pic>
-        <p:nvPicPr>
-          <p:cNvPr id="2" name="Picture 1" descr="figure_4.png"/>
-          <p:cNvPicPr>
-            <a:picLocks noChangeAspect="1"/>
-          </p:cNvPicPr>
-          <p:nvPr/>
-        </p:nvPicPr>
-        <p:blipFill>
-          <a:blip r:embed="rId2"/>
-          <a:stretch>
-            <a:fillRect/>
-          </a:stretch>
-        </p:blipFill>
-        <p:spPr>
-          <a:xfrm>
-            <a:off x="914400" y="914400"/>
-            <a:ext cx="7315200" cy="10917839"/>
-          </a:xfrm>
-          <a:prstGeom prst="rect">
-            <a:avLst/>
-          </a:prstGeom>
-        </p:spPr>
-      </p:pic>
-    </p:spTree>
-  </p:cSld>
-  <p:clrMapOvr>
-    <a:masterClrMapping/>
-  </p:clrMapOvr>
-</p:sld>
-</file>
-
-<file path=ppt/slides/slide5.xml><?xml version="1.0" encoding="utf-8"?>
-<p:sld xmlns:a="http://schemas.openxmlformats.org/drawingml/2006/main" xmlns:p="http://schemas.openxmlformats.org/presentationml/2006/main" xmlns:r="http://schemas.openxmlformats.org/officeDocument/2006/relationships">
-  <p:cSld>
-    <p:spTree>
-      <p:nvGrpSpPr>
-        <p:cNvPr id="1" name=""/>
-        <p:cNvGrpSpPr/>
-        <p:nvPr/>
-      </p:nvGrpSpPr>
-      <p:grpSpPr/>
-      <p:pic>
-        <p:nvPicPr>
-          <p:cNvPr id="2" name="Picture 1" descr="figure_5.png"/>
-          <p:cNvPicPr>
-            <a:picLocks noChangeAspect="1"/>
-          </p:cNvPicPr>
-          <p:nvPr/>
-        </p:nvPicPr>
-        <p:blipFill>
-          <a:blip r:embed="rId2"/>
-          <a:stretch>
-            <a:fillRect/>
-          </a:stretch>
-        </p:blipFill>
-        <p:spPr>
-          <a:xfrm>
-            <a:off x="914400" y="914400"/>
-            <a:ext cx="7315200" cy="11015757"/>
           </a:xfrm>
           <a:prstGeom prst="rect">
             <a:avLst/>

</xml_diff>

<commit_message>
More memory reduction, prep towards big run
</commit_message>
<xml_diff>
--- a/run_many_models_results.pptx
+++ b/run_many_models_results.pptx
@@ -6,6 +6,11 @@
   </p:sldMasterIdLst>
   <p:sldIdLst>
     <p:sldId id="256" r:id="rId7"/>
+    <p:sldId id="257" r:id="rId8"/>
+    <p:sldId id="258" r:id="rId9"/>
+    <p:sldId id="259" r:id="rId10"/>
+    <p:sldId id="260" r:id="rId11"/>
+    <p:sldId id="261" r:id="rId12"/>
   </p:sldIdLst>
   <p:sldSz cx="9144000" cy="6858000" type="screen4x3"/>
   <p:notesSz cx="6858000" cy="9144000"/>
@@ -3105,7 +3110,217 @@
         <p:spPr>
           <a:xfrm>
             <a:off x="914400" y="914400"/>
-            <a:ext cx="7315200" cy="10954935"/>
+            <a:ext cx="7315200" cy="12750112"/>
+          </a:xfrm>
+          <a:prstGeom prst="rect">
+            <a:avLst/>
+          </a:prstGeom>
+        </p:spPr>
+      </p:pic>
+    </p:spTree>
+  </p:cSld>
+  <p:clrMapOvr>
+    <a:masterClrMapping/>
+  </p:clrMapOvr>
+</p:sld>
+</file>
+
+<file path=ppt/slides/slide2.xml><?xml version="1.0" encoding="utf-8"?>
+<p:sld xmlns:a="http://schemas.openxmlformats.org/drawingml/2006/main" xmlns:p="http://schemas.openxmlformats.org/presentationml/2006/main" xmlns:r="http://schemas.openxmlformats.org/officeDocument/2006/relationships">
+  <p:cSld>
+    <p:spTree>
+      <p:nvGrpSpPr>
+        <p:cNvPr id="1" name=""/>
+        <p:cNvGrpSpPr/>
+        <p:nvPr/>
+      </p:nvGrpSpPr>
+      <p:grpSpPr/>
+      <p:pic>
+        <p:nvPicPr>
+          <p:cNvPr id="2" name="Picture 1" descr="figure_2.png"/>
+          <p:cNvPicPr>
+            <a:picLocks noChangeAspect="1"/>
+          </p:cNvPicPr>
+          <p:nvPr/>
+        </p:nvPicPr>
+        <p:blipFill>
+          <a:blip r:embed="rId2"/>
+          <a:stretch>
+            <a:fillRect/>
+          </a:stretch>
+        </p:blipFill>
+        <p:spPr>
+          <a:xfrm>
+            <a:off x="914400" y="914400"/>
+            <a:ext cx="7315200" cy="12750112"/>
+          </a:xfrm>
+          <a:prstGeom prst="rect">
+            <a:avLst/>
+          </a:prstGeom>
+        </p:spPr>
+      </p:pic>
+    </p:spTree>
+  </p:cSld>
+  <p:clrMapOvr>
+    <a:masterClrMapping/>
+  </p:clrMapOvr>
+</p:sld>
+</file>
+
+<file path=ppt/slides/slide3.xml><?xml version="1.0" encoding="utf-8"?>
+<p:sld xmlns:a="http://schemas.openxmlformats.org/drawingml/2006/main" xmlns:p="http://schemas.openxmlformats.org/presentationml/2006/main" xmlns:r="http://schemas.openxmlformats.org/officeDocument/2006/relationships">
+  <p:cSld>
+    <p:spTree>
+      <p:nvGrpSpPr>
+        <p:cNvPr id="1" name=""/>
+        <p:cNvGrpSpPr/>
+        <p:nvPr/>
+      </p:nvGrpSpPr>
+      <p:grpSpPr/>
+      <p:pic>
+        <p:nvPicPr>
+          <p:cNvPr id="2" name="Picture 1" descr="figure_3.png"/>
+          <p:cNvPicPr>
+            <a:picLocks noChangeAspect="1"/>
+          </p:cNvPicPr>
+          <p:nvPr/>
+        </p:nvPicPr>
+        <p:blipFill>
+          <a:blip r:embed="rId2"/>
+          <a:stretch>
+            <a:fillRect/>
+          </a:stretch>
+        </p:blipFill>
+        <p:spPr>
+          <a:xfrm>
+            <a:off x="914400" y="914400"/>
+            <a:ext cx="7315200" cy="12676554"/>
+          </a:xfrm>
+          <a:prstGeom prst="rect">
+            <a:avLst/>
+          </a:prstGeom>
+        </p:spPr>
+      </p:pic>
+    </p:spTree>
+  </p:cSld>
+  <p:clrMapOvr>
+    <a:masterClrMapping/>
+  </p:clrMapOvr>
+</p:sld>
+</file>
+
+<file path=ppt/slides/slide4.xml><?xml version="1.0" encoding="utf-8"?>
+<p:sld xmlns:a="http://schemas.openxmlformats.org/drawingml/2006/main" xmlns:p="http://schemas.openxmlformats.org/presentationml/2006/main" xmlns:r="http://schemas.openxmlformats.org/officeDocument/2006/relationships">
+  <p:cSld>
+    <p:spTree>
+      <p:nvGrpSpPr>
+        <p:cNvPr id="1" name=""/>
+        <p:cNvGrpSpPr/>
+        <p:nvPr/>
+      </p:nvGrpSpPr>
+      <p:grpSpPr/>
+      <p:pic>
+        <p:nvPicPr>
+          <p:cNvPr id="2" name="Picture 1" descr="figure_4.png"/>
+          <p:cNvPicPr>
+            <a:picLocks noChangeAspect="1"/>
+          </p:cNvPicPr>
+          <p:nvPr/>
+        </p:nvPicPr>
+        <p:blipFill>
+          <a:blip r:embed="rId2"/>
+          <a:stretch>
+            <a:fillRect/>
+          </a:stretch>
+        </p:blipFill>
+        <p:spPr>
+          <a:xfrm>
+            <a:off x="914400" y="914400"/>
+            <a:ext cx="7315200" cy="12750112"/>
+          </a:xfrm>
+          <a:prstGeom prst="rect">
+            <a:avLst/>
+          </a:prstGeom>
+        </p:spPr>
+      </p:pic>
+    </p:spTree>
+  </p:cSld>
+  <p:clrMapOvr>
+    <a:masterClrMapping/>
+  </p:clrMapOvr>
+</p:sld>
+</file>
+
+<file path=ppt/slides/slide5.xml><?xml version="1.0" encoding="utf-8"?>
+<p:sld xmlns:a="http://schemas.openxmlformats.org/drawingml/2006/main" xmlns:p="http://schemas.openxmlformats.org/presentationml/2006/main" xmlns:r="http://schemas.openxmlformats.org/officeDocument/2006/relationships">
+  <p:cSld>
+    <p:spTree>
+      <p:nvGrpSpPr>
+        <p:cNvPr id="1" name=""/>
+        <p:cNvGrpSpPr/>
+        <p:nvPr/>
+      </p:nvGrpSpPr>
+      <p:grpSpPr/>
+      <p:pic>
+        <p:nvPicPr>
+          <p:cNvPr id="2" name="Picture 1" descr="figure_5.png"/>
+          <p:cNvPicPr>
+            <a:picLocks noChangeAspect="1"/>
+          </p:cNvPicPr>
+          <p:nvPr/>
+        </p:nvPicPr>
+        <p:blipFill>
+          <a:blip r:embed="rId2"/>
+          <a:stretch>
+            <a:fillRect/>
+          </a:stretch>
+        </p:blipFill>
+        <p:spPr>
+          <a:xfrm>
+            <a:off x="914400" y="914400"/>
+            <a:ext cx="7315200" cy="12750112"/>
+          </a:xfrm>
+          <a:prstGeom prst="rect">
+            <a:avLst/>
+          </a:prstGeom>
+        </p:spPr>
+      </p:pic>
+    </p:spTree>
+  </p:cSld>
+  <p:clrMapOvr>
+    <a:masterClrMapping/>
+  </p:clrMapOvr>
+</p:sld>
+</file>
+
+<file path=ppt/slides/slide6.xml><?xml version="1.0" encoding="utf-8"?>
+<p:sld xmlns:a="http://schemas.openxmlformats.org/drawingml/2006/main" xmlns:p="http://schemas.openxmlformats.org/presentationml/2006/main" xmlns:r="http://schemas.openxmlformats.org/officeDocument/2006/relationships">
+  <p:cSld>
+    <p:spTree>
+      <p:nvGrpSpPr>
+        <p:cNvPr id="1" name=""/>
+        <p:cNvGrpSpPr/>
+        <p:nvPr/>
+      </p:nvGrpSpPr>
+      <p:grpSpPr/>
+      <p:pic>
+        <p:nvPicPr>
+          <p:cNvPr id="2" name="Picture 1" descr="figure_6.png"/>
+          <p:cNvPicPr>
+            <a:picLocks noChangeAspect="1"/>
+          </p:cNvPicPr>
+          <p:nvPr/>
+        </p:nvPicPr>
+        <p:blipFill>
+          <a:blip r:embed="rId2"/>
+          <a:stretch>
+            <a:fillRect/>
+          </a:stretch>
+        </p:blipFill>
+        <p:spPr>
+          <a:xfrm>
+            <a:off x="914400" y="914400"/>
+            <a:ext cx="7315200" cy="12821758"/>
           </a:xfrm>
           <a:prstGeom prst="rect">
             <a:avLst/>

</xml_diff>